<commit_message>
type system slide edits
</commit_message>
<xml_diff>
--- a/csc402-ln017.pptx
+++ b/csc402-ln017.pptx
@@ -12166,7 +12166,7 @@
         <p:spPr bwMode="auto">
           <a:xfrm>
             <a:off x="593725" y="2605088"/>
-            <a:ext cx="2535238" cy="366712"/>
+            <a:ext cx="5968301" cy="369332"/>
           </a:xfrm>
           <a:prstGeom prst="rect">
             <a:avLst/>
@@ -12214,10 +12214,26 @@
           <a:lstStyle/>
           <a:p>
             <a:r>
-              <a:rPr lang="en-US" sz="1800" u="sng"/>
-              <a:t>Subtype Polymorphism</a:t>
-            </a:r>
-            <a:endParaRPr lang="en-US" sz="1800"/>
+              <a:rPr lang="en-US" sz="1800" u="sng" dirty="0"/>
+              <a:t>Subtype </a:t>
+            </a:r>
+            <a:r>
+              <a:rPr lang="en-US" sz="1800" u="sng" dirty="0" smtClean="0"/>
+              <a:t>Polymorphism</a:t>
+            </a:r>
+            <a:r>
+              <a:rPr lang="en-US" sz="1800" dirty="0" smtClean="0"/>
+              <a:t> </a:t>
+            </a:r>
+            <a:r>
+              <a:rPr lang="mr-IN" sz="1800" dirty="0" smtClean="0"/>
+              <a:t>–</a:t>
+            </a:r>
+            <a:r>
+              <a:rPr lang="en-US" sz="1800" dirty="0" smtClean="0"/>
+              <a:t> essential for OO programming!</a:t>
+            </a:r>
+            <a:endParaRPr lang="en-US" sz="1800" dirty="0"/>
           </a:p>
         </p:txBody>
       </p:sp>
@@ -14341,39 +14357,83 @@
           <a:lstStyle/>
           <a:p>
             <a:r>
-              <a:rPr lang="en-US" sz="2600"/>
+              <a:rPr lang="en-US" sz="2600" dirty="0"/>
               <a:t>A principled approach to tagging terms and expressions with type names is called a </a:t>
             </a:r>
             <a:r>
-              <a:rPr lang="en-US" sz="2600" i="1"/>
+              <a:rPr lang="en-US" sz="2600" i="1" dirty="0"/>
               <a:t>type system</a:t>
             </a:r>
           </a:p>
           <a:p>
             <a:r>
-              <a:rPr lang="en-US" sz="2600"/>
+              <a:rPr lang="en-US" sz="2600" dirty="0"/>
               <a:t>Every modern programming language has one</a:t>
             </a:r>
           </a:p>
           <a:p>
             <a:r>
-              <a:rPr lang="en-US" sz="2600"/>
+              <a:rPr lang="en-US" sz="2600" dirty="0"/>
               <a:t>We have</a:t>
             </a:r>
           </a:p>
           <a:p>
             <a:pPr lvl="1"/>
             <a:r>
-              <a:rPr lang="en-US" sz="2200"/>
-              <a:t>Implicit type systems - type systems where the system automatically recognizes the type of a variable or constant</a:t>
-            </a:r>
+              <a:rPr lang="en-US" sz="2200" dirty="0"/>
+              <a:t>d</a:t>
+            </a:r>
+            <a:r>
+              <a:rPr lang="en-US" sz="2200" dirty="0" smtClean="0"/>
+              <a:t>ynamic type </a:t>
+            </a:r>
+            <a:r>
+              <a:rPr lang="en-US" sz="2200" dirty="0"/>
+              <a:t>systems - type systems where the system automatically recognizes the type of a variable or </a:t>
+            </a:r>
+            <a:r>
+              <a:rPr lang="en-US" sz="2200" dirty="0" smtClean="0"/>
+              <a:t>constant</a:t>
+            </a:r>
+          </a:p>
+          <a:p>
+            <a:pPr lvl="2"/>
+            <a:r>
+              <a:rPr lang="en-US" sz="1900" dirty="0" smtClean="0"/>
+              <a:t>e.g. Python, Haskell, JavaScript</a:t>
+            </a:r>
+            <a:endParaRPr lang="en-US" sz="1900" dirty="0"/>
           </a:p>
           <a:p>
             <a:pPr lvl="1"/>
             <a:r>
-              <a:rPr lang="en-US" sz="2200"/>
-              <a:t>Explicit type systems - type systems where the user has to explicitly declare the type of variables (and sometimes constants).</a:t>
-            </a:r>
+              <a:rPr lang="en-US" sz="2200" dirty="0" smtClean="0"/>
+              <a:t>static type </a:t>
+            </a:r>
+            <a:r>
+              <a:rPr lang="en-US" sz="2200" dirty="0"/>
+              <a:t>systems - type systems where the user has to explicitly declare the type of variables </a:t>
+            </a:r>
+            <a:r>
+              <a:rPr lang="en-US" sz="2200" dirty="0" smtClean="0"/>
+              <a:t>and </a:t>
+            </a:r>
+            <a:r>
+              <a:rPr lang="en-US" sz="2200" dirty="0"/>
+              <a:t>sometimes </a:t>
+            </a:r>
+            <a:r>
+              <a:rPr lang="en-US" sz="2200" dirty="0" smtClean="0"/>
+              <a:t>constants </a:t>
+            </a:r>
+          </a:p>
+          <a:p>
+            <a:pPr lvl="2"/>
+            <a:r>
+              <a:rPr lang="en-US" sz="1900" dirty="0" smtClean="0"/>
+              <a:t>e.g. Java, C, C++</a:t>
+            </a:r>
+            <a:endParaRPr lang="en-US" sz="1900" dirty="0"/>
           </a:p>
         </p:txBody>
       </p:sp>
@@ -14444,11 +14504,13 @@
         <p:spPr>
           <a:xfrm>
             <a:off x="457200" y="2063750"/>
-            <a:ext cx="8229600" cy="3270250"/>
+            <a:ext cx="8229600" cy="4413250"/>
           </a:xfrm>
         </p:spPr>
         <p:txBody>
-          <a:bodyPr/>
+          <a:bodyPr>
+            <a:normAutofit fontScale="92500" lnSpcReduction="10000"/>
+          </a:bodyPr>
           <a:lstStyle/>
           <a:p>
             <a:pPr>
@@ -14457,31 +14519,31 @@
               </a:lnSpc>
             </a:pPr>
             <a:r>
-              <a:rPr lang="en-US" sz="2600"/>
+              <a:rPr lang="en-US" sz="2600" dirty="0"/>
               <a:t>Types allow the language system to assist the developer in writing </a:t>
             </a:r>
             <a:r>
-              <a:rPr lang="en-US" sz="2600" i="1"/>
+              <a:rPr lang="en-US" sz="2600" i="1" dirty="0"/>
               <a:t>better programs</a:t>
             </a:r>
             <a:r>
-              <a:rPr lang="en-US" sz="2600"/>
+              <a:rPr lang="en-US" sz="2600" dirty="0"/>
               <a:t>. </a:t>
             </a:r>
             <a:r>
-              <a:rPr lang="en-US" sz="2600" i="1"/>
+              <a:rPr lang="en-US" sz="2600" i="1" dirty="0"/>
               <a:t>Type mismatches</a:t>
             </a:r>
             <a:r>
-              <a:rPr lang="en-US" sz="2600"/>
+              <a:rPr lang="en-US" sz="2600" dirty="0"/>
               <a:t> in a program usually indicate some sort of </a:t>
             </a:r>
             <a:r>
-              <a:rPr lang="en-US" sz="2600" i="1"/>
+              <a:rPr lang="en-US" sz="2600" i="1" dirty="0"/>
               <a:t>programming error</a:t>
             </a:r>
             <a:r>
-              <a:rPr lang="en-US" sz="2600"/>
+              <a:rPr lang="en-US" sz="2600" dirty="0"/>
               <a:t>.</a:t>
             </a:r>
           </a:p>
@@ -14492,19 +14554,19 @@
               </a:lnSpc>
             </a:pPr>
             <a:r>
-              <a:rPr lang="en-US" sz="2200" u="sng"/>
+              <a:rPr lang="en-US" sz="2200" u="sng" dirty="0"/>
               <a:t>Static type checking</a:t>
             </a:r>
             <a:r>
-              <a:rPr lang="en-US" sz="2200"/>
+              <a:rPr lang="en-US" sz="2200" dirty="0"/>
               <a:t> – check the types of all statements and expressions at </a:t>
             </a:r>
             <a:r>
-              <a:rPr lang="en-US" sz="2200" u="sng"/>
+              <a:rPr lang="en-US" sz="2200" u="sng" dirty="0"/>
               <a:t>compile time</a:t>
             </a:r>
             <a:r>
-              <a:rPr lang="en-US" sz="2200"/>
+              <a:rPr lang="en-US" sz="2200" dirty="0"/>
               <a:t>.</a:t>
             </a:r>
           </a:p>
@@ -14515,22 +14577,67 @@
               </a:lnSpc>
             </a:pPr>
             <a:r>
-              <a:rPr lang="en-US" sz="2200" u="sng"/>
+              <a:rPr lang="en-US" sz="2200" u="sng" dirty="0"/>
               <a:t>Dynamic type checking</a:t>
             </a:r>
             <a:r>
-              <a:rPr lang="en-US" sz="2200"/>
+              <a:rPr lang="en-US" sz="2200" dirty="0"/>
               <a:t> – check the types at </a:t>
             </a:r>
             <a:r>
-              <a:rPr lang="en-US" sz="2200" u="sng"/>
+              <a:rPr lang="en-US" sz="2200" u="sng" dirty="0"/>
               <a:t>runtime</a:t>
             </a:r>
             <a:r>
-              <a:rPr lang="en-US" sz="2200"/>
+              <a:rPr lang="en-US" sz="2200" dirty="0" smtClean="0"/>
               <a:t>.</a:t>
             </a:r>
-            <a:endParaRPr lang="en-US" sz="2200" u="sng"/>
+          </a:p>
+          <a:p>
+            <a:pPr marL="393700" indent="-285750">
+              <a:lnSpc>
+                <a:spcPct val="90000"/>
+              </a:lnSpc>
+            </a:pPr>
+            <a:r>
+              <a:rPr lang="en-US" sz="2600" dirty="0" smtClean="0"/>
+              <a:t>Languages with a static type system can be type checked dynamically and statically</a:t>
+            </a:r>
+          </a:p>
+          <a:p>
+            <a:pPr marL="393700" indent="-285750">
+              <a:lnSpc>
+                <a:spcPct val="90000"/>
+              </a:lnSpc>
+            </a:pPr>
+            <a:r>
+              <a:rPr lang="en-US" sz="2600" dirty="0" smtClean="0"/>
+              <a:t>Languages with a dynamic type system can only be type checked dynamically</a:t>
+            </a:r>
+          </a:p>
+          <a:p>
+            <a:pPr marL="393700" indent="-285750">
+              <a:lnSpc>
+                <a:spcPct val="90000"/>
+              </a:lnSpc>
+            </a:pPr>
+            <a:r>
+              <a:rPr lang="en-US" sz="2600" dirty="0" smtClean="0"/>
+              <a:t>New research: </a:t>
+            </a:r>
+            <a:r>
+              <a:rPr lang="en-US" sz="2600" u="sng" dirty="0" smtClean="0"/>
+              <a:t>gradual typing </a:t>
+            </a:r>
+            <a:r>
+              <a:rPr lang="mr-IN" sz="2600" dirty="0" smtClean="0"/>
+              <a:t>–</a:t>
+            </a:r>
+            <a:r>
+              <a:rPr lang="en-US" sz="2600" dirty="0" smtClean="0"/>
+              <a:t> type check as much as possible statically and then do the rest dynamical.</a:t>
+            </a:r>
+            <a:endParaRPr lang="en-US" sz="2600" dirty="0"/>
           </a:p>
         </p:txBody>
       </p:sp>
@@ -14642,7 +14749,7 @@
           <a:lstStyle/>
           <a:p>
             <a:r>
-              <a:rPr lang="en-US" sz="2400" b="1"/>
+              <a:rPr lang="en-US" sz="2400" b="1" dirty="0"/>
               <a:t>A Type is a Set of Values</a:t>
             </a:r>
           </a:p>
@@ -14707,77 +14814,93 @@
           <a:lstStyle/>
           <a:p>
             <a:r>
-              <a:rPr lang="en-US" sz="1600"/>
+              <a:rPr lang="en-US" sz="1600" dirty="0"/>
               <a:t>Consider the statement:</a:t>
             </a:r>
           </a:p>
           <a:p>
-            <a:endParaRPr lang="en-US" sz="1600"/>
-          </a:p>
-          <a:p>
-            <a:r>
-              <a:rPr lang="en-US" sz="1600"/>
-              <a:t>	int n;</a:t>
-            </a:r>
-          </a:p>
-          <a:p>
-            <a:endParaRPr lang="en-US" sz="1600"/>
-          </a:p>
-          <a:p>
-            <a:r>
-              <a:rPr lang="en-US" sz="1600"/>
+            <a:endParaRPr lang="en-US" sz="1600" dirty="0"/>
+          </a:p>
+          <a:p>
+            <a:r>
+              <a:rPr lang="en-US" sz="1600" dirty="0"/>
+              <a:t>	</a:t>
+            </a:r>
+            <a:r>
+              <a:rPr lang="en-US" sz="1600" dirty="0" err="1"/>
+              <a:t>int</a:t>
+            </a:r>
+            <a:r>
+              <a:rPr lang="en-US" sz="1600" dirty="0"/>
+              <a:t> n;</a:t>
+            </a:r>
+          </a:p>
+          <a:p>
+            <a:endParaRPr lang="en-US" sz="1600" dirty="0"/>
+          </a:p>
+          <a:p>
+            <a:r>
+              <a:rPr lang="en-US" sz="1600" dirty="0"/>
               <a:t>Here we declare n to be a variable of </a:t>
             </a:r>
             <a:r>
-              <a:rPr lang="en-US" sz="1600" i="1"/>
+              <a:rPr lang="en-US" sz="1600" i="1" dirty="0"/>
               <a:t>type</a:t>
             </a:r>
             <a:r>
-              <a:rPr lang="en-US" sz="1600"/>
-              <a:t> int; what we mean, n can take on any </a:t>
-            </a:r>
-          </a:p>
-          <a:p>
-            <a:r>
-              <a:rPr lang="en-US" sz="1600"/>
+              <a:rPr lang="en-US" sz="1600" dirty="0"/>
+              <a:t> </a:t>
+            </a:r>
+            <a:r>
+              <a:rPr lang="en-US" sz="1600" dirty="0" err="1"/>
+              <a:t>int</a:t>
+            </a:r>
+            <a:r>
+              <a:rPr lang="en-US" sz="1600" dirty="0"/>
+              <a:t>; what we mean, n can take on any </a:t>
+            </a:r>
+          </a:p>
+          <a:p>
+            <a:r>
+              <a:rPr lang="en-US" sz="1600" dirty="0"/>
               <a:t>value from the </a:t>
             </a:r>
             <a:r>
-              <a:rPr lang="en-US" sz="1600" i="1"/>
+              <a:rPr lang="en-US" sz="1600" i="1" dirty="0"/>
               <a:t>set of all integer values</a:t>
             </a:r>
             <a:r>
-              <a:rPr lang="en-US" sz="1600"/>
+              <a:rPr lang="en-US" sz="1600" dirty="0"/>
               <a:t>.</a:t>
             </a:r>
           </a:p>
           <a:p>
-            <a:endParaRPr lang="en-US" sz="1600"/>
-          </a:p>
-          <a:p>
-            <a:r>
-              <a:rPr lang="en-US" sz="1600"/>
+            <a:endParaRPr lang="en-US" sz="1600" dirty="0"/>
+          </a:p>
+          <a:p>
+            <a:r>
+              <a:rPr lang="en-US" sz="1600" dirty="0"/>
               <a:t>Also observe that the elements in a type share a common representation: each</a:t>
             </a:r>
           </a:p>
           <a:p>
             <a:r>
-              <a:rPr lang="en-US" sz="1600"/>
+              <a:rPr lang="en-US" sz="1600" dirty="0"/>
               <a:t>element is encoded in the same way (float, double, char, etc.)</a:t>
             </a:r>
           </a:p>
           <a:p>
-            <a:endParaRPr lang="en-US" sz="1600"/>
-          </a:p>
-          <a:p>
-            <a:r>
-              <a:rPr lang="en-US" sz="1600"/>
+            <a:endParaRPr lang="en-US" sz="1600" dirty="0"/>
+          </a:p>
+          <a:p>
+            <a:r>
+              <a:rPr lang="en-US" sz="1600" dirty="0"/>
               <a:t>Also, all elements of a type share the same operations the language supports </a:t>
             </a:r>
           </a:p>
           <a:p>
             <a:r>
-              <a:rPr lang="en-US" sz="1600"/>
+              <a:rPr lang="en-US" sz="1600" dirty="0"/>
               <a:t>for them.</a:t>
             </a:r>
           </a:p>

</xml_diff>